<commit_message>
Updating final Capstone Presentation
</commit_message>
<xml_diff>
--- a/Appointments_Presentation.pptx
+++ b/Appointments_Presentation.pptx
@@ -5,7 +5,7 @@
     <p:sldMasterId id="2147483879" r:id="rId1"/>
   </p:sldMasterIdLst>
   <p:notesMasterIdLst>
-    <p:notesMasterId r:id="rId13"/>
+    <p:notesMasterId r:id="rId14"/>
   </p:notesMasterIdLst>
   <p:sldIdLst>
     <p:sldId id="256" r:id="rId2"/>
@@ -16,9 +16,10 @@
     <p:sldId id="259" r:id="rId7"/>
     <p:sldId id="260" r:id="rId8"/>
     <p:sldId id="271" r:id="rId9"/>
-    <p:sldId id="267" r:id="rId10"/>
-    <p:sldId id="269" r:id="rId11"/>
-    <p:sldId id="265" r:id="rId12"/>
+    <p:sldId id="272" r:id="rId10"/>
+    <p:sldId id="267" r:id="rId11"/>
+    <p:sldId id="269" r:id="rId12"/>
+    <p:sldId id="265" r:id="rId13"/>
   </p:sldIdLst>
   <p:sldSz cx="12192000" cy="6858000"/>
   <p:notesSz cx="6858000" cy="9144000"/>
@@ -549,6 +550,90 @@
     <p:extLst>
       <p:ext uri="{BB962C8B-B14F-4D97-AF65-F5344CB8AC3E}">
         <p14:creationId xmlns:p14="http://schemas.microsoft.com/office/powerpoint/2010/main" val="2477870025"/>
+      </p:ext>
+    </p:extLst>
+  </p:cSld>
+  <p:clrMapOvr>
+    <a:masterClrMapping/>
+  </p:clrMapOvr>
+</p:notes>
+</file>
+
+<file path=ppt/notesSlides/notesSlide2.xml><?xml version="1.0" encoding="utf-8"?>
+<p:notes xmlns:a="http://schemas.openxmlformats.org/drawingml/2006/main" xmlns:r="http://schemas.openxmlformats.org/officeDocument/2006/relationships" xmlns:p="http://schemas.openxmlformats.org/presentationml/2006/main">
+  <p:cSld>
+    <p:spTree>
+      <p:nvGrpSpPr>
+        <p:cNvPr id="1" name=""/>
+        <p:cNvGrpSpPr/>
+        <p:nvPr/>
+      </p:nvGrpSpPr>
+      <p:grpSpPr>
+        <a:xfrm>
+          <a:off x="0" y="0"/>
+          <a:ext cx="0" cy="0"/>
+          <a:chOff x="0" y="0"/>
+          <a:chExt cx="0" cy="0"/>
+        </a:xfrm>
+      </p:grpSpPr>
+      <p:sp>
+        <p:nvSpPr>
+          <p:cNvPr id="2" name="Slide Image Placeholder 1"/>
+          <p:cNvSpPr>
+            <a:spLocks noGrp="1" noRot="1" noChangeAspect="1"/>
+          </p:cNvSpPr>
+          <p:nvPr>
+            <p:ph type="sldImg"/>
+          </p:nvPr>
+        </p:nvSpPr>
+        <p:spPr/>
+      </p:sp>
+      <p:sp>
+        <p:nvSpPr>
+          <p:cNvPr id="3" name="Notes Placeholder 2"/>
+          <p:cNvSpPr>
+            <a:spLocks noGrp="1"/>
+          </p:cNvSpPr>
+          <p:nvPr>
+            <p:ph type="body" idx="1"/>
+          </p:nvPr>
+        </p:nvSpPr>
+        <p:spPr/>
+        <p:txBody>
+          <a:bodyPr/>
+          <a:lstStyle/>
+          <a:p>
+            <a:endParaRPr lang="en-US" dirty="0"/>
+          </a:p>
+        </p:txBody>
+      </p:sp>
+      <p:sp>
+        <p:nvSpPr>
+          <p:cNvPr id="4" name="Slide Number Placeholder 3"/>
+          <p:cNvSpPr>
+            <a:spLocks noGrp="1"/>
+          </p:cNvSpPr>
+          <p:nvPr>
+            <p:ph type="sldNum" sz="quarter" idx="10"/>
+          </p:nvPr>
+        </p:nvSpPr>
+        <p:spPr/>
+        <p:txBody>
+          <a:bodyPr/>
+          <a:lstStyle/>
+          <a:p>
+            <a:fld id="{B39125DA-AB1A-6D43-8D0B-C159119E55AC}" type="slidenum">
+              <a:rPr lang="en-US" smtClean="0"/>
+              <a:t>9</a:t>
+            </a:fld>
+            <a:endParaRPr lang="en-US"/>
+          </a:p>
+        </p:txBody>
+      </p:sp>
+    </p:spTree>
+    <p:extLst>
+      <p:ext uri="{BB962C8B-B14F-4D97-AF65-F5344CB8AC3E}">
+        <p14:creationId xmlns:p14="http://schemas.microsoft.com/office/powerpoint/2010/main" val="3919443665"/>
       </p:ext>
     </p:extLst>
   </p:cSld>
@@ -4405,7 +4490,7 @@
           <p:cNvPr id="2" name="Title 1">
             <a:extLst>
               <a:ext uri="{FF2B5EF4-FFF2-40B4-BE49-F238E27FC236}">
-                <a16:creationId xmlns:a16="http://schemas.microsoft.com/office/drawing/2014/main" id="{BC1DCEB9-60EA-B14A-8369-DF6D269C173C}"/>
+                <a16:creationId xmlns:a16="http://schemas.microsoft.com/office/drawing/2014/main" id="{43F0D8AE-4F73-8740-ADF8-43402226855B}"/>
               </a:ext>
             </a:extLst>
           </p:cNvPr>
@@ -4423,7 +4508,7 @@
           <a:p>
             <a:r>
               <a:rPr lang="en-US" dirty="0"/>
-              <a:t>Recommendations</a:t>
+              <a:t>Model Performance</a:t>
             </a:r>
           </a:p>
         </p:txBody>
@@ -4433,7 +4518,7 @@
           <p:cNvPr id="3" name="Content Placeholder 2">
             <a:extLst>
               <a:ext uri="{FF2B5EF4-FFF2-40B4-BE49-F238E27FC236}">
-                <a16:creationId xmlns:a16="http://schemas.microsoft.com/office/drawing/2014/main" id="{34493926-EA48-7243-AFA4-0AFE6EF87E04}"/>
+                <a16:creationId xmlns:a16="http://schemas.microsoft.com/office/drawing/2014/main" id="{769FC80D-22B7-2241-90BD-BD58BB25E42D}"/>
               </a:ext>
             </a:extLst>
           </p:cNvPr>
@@ -4446,30 +4531,38 @@
         </p:nvSpPr>
         <p:spPr/>
         <p:txBody>
-          <a:bodyPr/>
-          <a:lstStyle/>
-          <a:p>
+          <a:bodyPr>
+            <a:normAutofit/>
+          </a:bodyPr>
+          <a:lstStyle/>
+          <a:p>
+            <a:pPr marL="0" indent="0">
+              <a:buNone/>
+            </a:pPr>
             <a:r>
               <a:rPr lang="en-US" dirty="0"/>
-              <a:t>The model can be improved by adding new information.  For example, weather information is not included in the original data but is widely available and can be added in. </a:t>
+              <a:t>Model Performance Summary:</a:t>
             </a:r>
           </a:p>
           <a:p>
             <a:r>
               <a:rPr lang="en-US" dirty="0"/>
-              <a:t>Further analysis can be done calculating the expected number of missed appointments when there are multiple appointments available in a time slot. Combining the likelihoods of each patient in a specific time slot would allow the overall likelihood of a desired number of patients to be calculated.</a:t>
+              <a:t>When the model predicts an appointment will be missed, it is expected to be accurate 39 % of the time.</a:t>
             </a:r>
           </a:p>
           <a:p>
             <a:r>
               <a:rPr lang="en-US" dirty="0"/>
-              <a:t>There are some valuable insights in the data exploration. For example, patients who missed 10% or less of their prior appointments are overwhelmingly expected to make their appointments.  Making sure not to over-book these patients would be recommended because they are unlikely to miss anyway, and it would keep the best patients happy.</a:t>
-            </a:r>
-          </a:p>
-          <a:p>
-            <a:pPr marL="0" indent="0">
-              <a:buNone/>
-            </a:pPr>
+              <a:t>The overall historical rate of missed appointments is 16%.  This means that with no model, predicting an appointment will be missed is only expected to be correct 16% of the time, and will be incorrect the remaining 84% of the time.</a:t>
+            </a:r>
+          </a:p>
+          <a:p>
+            <a:r>
+              <a:rPr lang="en-US" dirty="0"/>
+              <a:t>The model improves the accuracy of predicting a missed appointment from 16% to 39%.</a:t>
+            </a:r>
+          </a:p>
+          <a:p>
             <a:endParaRPr lang="en-US" dirty="0"/>
           </a:p>
         </p:txBody>
@@ -4477,7 +4570,7 @@
     </p:spTree>
     <p:extLst>
       <p:ext uri="{BB962C8B-B14F-4D97-AF65-F5344CB8AC3E}">
-        <p14:creationId xmlns:p14="http://schemas.microsoft.com/office/powerpoint/2010/main" val="4198729794"/>
+        <p14:creationId xmlns:p14="http://schemas.microsoft.com/office/powerpoint/2010/main" val="3023246864"/>
       </p:ext>
     </p:extLst>
   </p:cSld>
@@ -4509,6 +4602,110 @@
           <p:cNvPr id="2" name="Title 1">
             <a:extLst>
               <a:ext uri="{FF2B5EF4-FFF2-40B4-BE49-F238E27FC236}">
+                <a16:creationId xmlns:a16="http://schemas.microsoft.com/office/drawing/2014/main" id="{BC1DCEB9-60EA-B14A-8369-DF6D269C173C}"/>
+              </a:ext>
+            </a:extLst>
+          </p:cNvPr>
+          <p:cNvSpPr>
+            <a:spLocks noGrp="1"/>
+          </p:cNvSpPr>
+          <p:nvPr>
+            <p:ph type="title"/>
+          </p:nvPr>
+        </p:nvSpPr>
+        <p:spPr/>
+        <p:txBody>
+          <a:bodyPr/>
+          <a:lstStyle/>
+          <a:p>
+            <a:r>
+              <a:rPr lang="en-US" dirty="0"/>
+              <a:t>Recommendations</a:t>
+            </a:r>
+          </a:p>
+        </p:txBody>
+      </p:sp>
+      <p:sp>
+        <p:nvSpPr>
+          <p:cNvPr id="3" name="Content Placeholder 2">
+            <a:extLst>
+              <a:ext uri="{FF2B5EF4-FFF2-40B4-BE49-F238E27FC236}">
+                <a16:creationId xmlns:a16="http://schemas.microsoft.com/office/drawing/2014/main" id="{34493926-EA48-7243-AFA4-0AFE6EF87E04}"/>
+              </a:ext>
+            </a:extLst>
+          </p:cNvPr>
+          <p:cNvSpPr>
+            <a:spLocks noGrp="1"/>
+          </p:cNvSpPr>
+          <p:nvPr>
+            <p:ph idx="1"/>
+          </p:nvPr>
+        </p:nvSpPr>
+        <p:spPr/>
+        <p:txBody>
+          <a:bodyPr/>
+          <a:lstStyle/>
+          <a:p>
+            <a:r>
+              <a:rPr lang="en-US" dirty="0"/>
+              <a:t>The model can be improved by adding new information.  For example, weather information is not included in the original data but is widely available and can be added in. </a:t>
+            </a:r>
+          </a:p>
+          <a:p>
+            <a:r>
+              <a:rPr lang="en-US" dirty="0"/>
+              <a:t>Further analysis can be done calculating the expected number of missed appointments when there are multiple appointments available in a time slot.  Combining the likelihoods of each patient showing up in a specific time slot would allow the overall likelihood of a desired number of patients to be calculated.</a:t>
+            </a:r>
+          </a:p>
+          <a:p>
+            <a:r>
+              <a:rPr lang="en-US" dirty="0"/>
+              <a:t>There are some valuable insights in the data exploration. For example, patients who missed 10% or less of their prior appointments are overwhelmingly expected to make their appointments.  Making sure not to over-book these patients would be recommended because they are unlikely to miss anyway, and it would keep the best patients happy.</a:t>
+            </a:r>
+          </a:p>
+          <a:p>
+            <a:pPr marL="0" indent="0">
+              <a:buNone/>
+            </a:pPr>
+            <a:endParaRPr lang="en-US" dirty="0"/>
+          </a:p>
+        </p:txBody>
+      </p:sp>
+    </p:spTree>
+    <p:extLst>
+      <p:ext uri="{BB962C8B-B14F-4D97-AF65-F5344CB8AC3E}">
+        <p14:creationId xmlns:p14="http://schemas.microsoft.com/office/powerpoint/2010/main" val="4198729794"/>
+      </p:ext>
+    </p:extLst>
+  </p:cSld>
+  <p:clrMapOvr>
+    <a:masterClrMapping/>
+  </p:clrMapOvr>
+</p:sld>
+</file>
+
+<file path=ppt/slides/slide12.xml><?xml version="1.0" encoding="utf-8"?>
+<p:sld xmlns:a="http://schemas.openxmlformats.org/drawingml/2006/main" xmlns:r="http://schemas.openxmlformats.org/officeDocument/2006/relationships" xmlns:p="http://schemas.openxmlformats.org/presentationml/2006/main">
+  <p:cSld>
+    <p:spTree>
+      <p:nvGrpSpPr>
+        <p:cNvPr id="1" name=""/>
+        <p:cNvGrpSpPr/>
+        <p:nvPr/>
+      </p:nvGrpSpPr>
+      <p:grpSpPr>
+        <a:xfrm>
+          <a:off x="0" y="0"/>
+          <a:ext cx="0" cy="0"/>
+          <a:chOff x="0" y="0"/>
+          <a:chExt cx="0" cy="0"/>
+        </a:xfrm>
+      </p:grpSpPr>
+      <p:sp>
+        <p:nvSpPr>
+          <p:cNvPr id="2" name="Title 1">
+            <a:extLst>
+              <a:ext uri="{FF2B5EF4-FFF2-40B4-BE49-F238E27FC236}">
                 <a16:creationId xmlns:a16="http://schemas.microsoft.com/office/drawing/2014/main" id="{B1C90527-79F0-3247-A47D-210E0A289C76}"/>
               </a:ext>
             </a:extLst>
@@ -4578,7 +4775,7 @@
             </a:pPr>
             <a:r>
               <a:rPr lang="en-US" dirty="0"/>
-              <a:t>With a perfect prediction, a medical provider could completely make up for the lost revenue due to missed appointments by overbooking by just the right amount, without resulting in times the overbooking leads to having more patients than desired.  Due to the inherent prediction error,  there will still be times that the overbooking is too much or too little, meaning there will still times where there are more or less patients than desired. However, since the model predictions are better than predicting without a model,  the model allows a medical provider to over-book more intelligently, which will allow more lost revenue to be made up for with over-booking  with fewer  negative consequences.</a:t>
+              <a:t>With a perfect prediction, a medical provider could completely make up for the lost revenue due to missed appointments by overbooking by just the right amount, without resulting in times the overbooking leads to having more patients than desired.  Due to the inherent prediction error,  there will still be times that the overbooking is too much or too little, meaning there will still times where there are more or less patients than desired. However, since the model predictions are better than predicting without a model,  the model allows a medical provider to over-book more intelligently, which will allow more lost revenue to be made up for with over-booking with fewer  negative consequence</a:t>
             </a:r>
           </a:p>
         </p:txBody>
@@ -4906,7 +5103,12 @@
             <p:ph idx="1"/>
           </p:nvPr>
         </p:nvSpPr>
-        <p:spPr/>
+        <p:spPr>
+          <a:xfrm>
+            <a:off x="581192" y="2180497"/>
+            <a:ext cx="11029615" cy="2614788"/>
+          </a:xfrm>
+        </p:spPr>
         <p:txBody>
           <a:bodyPr/>
           <a:lstStyle/>
@@ -5914,7 +6116,7 @@
           <p:cNvPr id="2" name="Title 1">
             <a:extLst>
               <a:ext uri="{FF2B5EF4-FFF2-40B4-BE49-F238E27FC236}">
-                <a16:creationId xmlns:a16="http://schemas.microsoft.com/office/drawing/2014/main" id="{43F0D8AE-4F73-8740-ADF8-43402226855B}"/>
+                <a16:creationId xmlns:a16="http://schemas.microsoft.com/office/drawing/2014/main" id="{1E69625D-A682-1C47-AB58-5783CA622B4B}"/>
               </a:ext>
             </a:extLst>
           </p:cNvPr>
@@ -5932,7 +6134,7 @@
           <a:p>
             <a:r>
               <a:rPr lang="en-US" dirty="0"/>
-              <a:t>Model Performance</a:t>
+              <a:t>Modelling</a:t>
             </a:r>
           </a:p>
         </p:txBody>
@@ -5942,7 +6144,7 @@
           <p:cNvPr id="3" name="Content Placeholder 2">
             <a:extLst>
               <a:ext uri="{FF2B5EF4-FFF2-40B4-BE49-F238E27FC236}">
-                <a16:creationId xmlns:a16="http://schemas.microsoft.com/office/drawing/2014/main" id="{769FC80D-22B7-2241-90BD-BD58BB25E42D}"/>
+                <a16:creationId xmlns:a16="http://schemas.microsoft.com/office/drawing/2014/main" id="{6E70C8FC-6BCD-0D49-949F-FB5028104D4C}"/>
               </a:ext>
             </a:extLst>
           </p:cNvPr>
@@ -5955,45 +6157,51 @@
         </p:nvSpPr>
         <p:spPr/>
         <p:txBody>
-          <a:bodyPr>
-            <a:normAutofit lnSpcReduction="10000"/>
-          </a:bodyPr>
-          <a:lstStyle/>
-          <a:p>
-            <a:pPr marL="0" indent="0">
-              <a:buNone/>
-            </a:pPr>
+          <a:bodyPr/>
+          <a:lstStyle/>
+          <a:p>
+            <a:endParaRPr lang="en-US" dirty="0"/>
+          </a:p>
+          <a:p>
+            <a:endParaRPr lang="en-US" dirty="0"/>
+          </a:p>
+          <a:p>
             <a:r>
               <a:rPr lang="en-US" dirty="0"/>
-              <a:t>Two different machine learning models were tested, and the one that best predicted the missed appointments was chosen.  The chosen model can be used to predict whether or not an appointment will be missed, and the probability that an appointment will be kept or missed.</a:t>
-            </a:r>
-          </a:p>
-          <a:p>
-            <a:pPr marL="0" indent="0">
-              <a:buNone/>
-            </a:pPr>
+              <a:t>The data was split into a test set (60%), validation set (20%), and a test set (20%).</a:t>
+            </a:r>
+          </a:p>
+          <a:p>
             <a:r>
               <a:rPr lang="en-US" dirty="0"/>
-              <a:t>Model Performance Highlights:</a:t>
-            </a:r>
-          </a:p>
-          <a:p>
+              <a:t>Random Forest and </a:t>
+            </a:r>
+            <a:r>
+              <a:rPr lang="en-US" dirty="0" err="1"/>
+              <a:t>glm</a:t>
+            </a:r>
             <a:r>
               <a:rPr lang="en-US" dirty="0"/>
-              <a:t>When the model predicts an appointment will be missed, it is expected to be accurate 39 % of the time.</a:t>
+              <a:t> models were initially fit to the training set.</a:t>
             </a:r>
           </a:p>
           <a:p>
             <a:r>
               <a:rPr lang="en-US" dirty="0"/>
-              <a:t>The overall historical rate of missed appointments is 16%.  This means that with no model, predicting an appointment will be missed is only expected to be correct 16% of the time, and will be incorrect the remaining 84% of the time.</a:t>
+              <a:t>The validation set was used to see how well the models perform on unseen data to choose the best one.  The random forest model performed best.</a:t>
             </a:r>
           </a:p>
           <a:p>
             <a:r>
               <a:rPr lang="en-US" dirty="0"/>
-              <a:t>While 39% accuracy in predicting missed appointments means that 61% of the time the prediction will be in error, this is still a large improvement over having no model at all, where predicting an appointment will be missed is in error 84% of the time.</a:t>
-            </a:r>
+              <a:t>Finally,  the random forest model was tested on the test data to estimate the expected future results.</a:t>
+            </a:r>
+          </a:p>
+          <a:p>
+            <a:endParaRPr lang="en-US" dirty="0"/>
+          </a:p>
+          <a:p>
+            <a:endParaRPr lang="en-US" dirty="0"/>
           </a:p>
           <a:p>
             <a:endParaRPr lang="en-US" dirty="0"/>
@@ -6003,7 +6211,7 @@
     </p:spTree>
     <p:extLst>
       <p:ext uri="{BB962C8B-B14F-4D97-AF65-F5344CB8AC3E}">
-        <p14:creationId xmlns:p14="http://schemas.microsoft.com/office/powerpoint/2010/main" val="3023246864"/>
+        <p14:creationId xmlns:p14="http://schemas.microsoft.com/office/powerpoint/2010/main" val="3856963576"/>
       </p:ext>
     </p:extLst>
   </p:cSld>

</xml_diff>